<commit_message>
CP states from 1-10 into 1-11 (adding non-carnivorous)
</commit_message>
<xml_diff>
--- a/models/state_classification_n1_simple.pptx
+++ b/models/state_classification_n1_simple.pptx
@@ -3066,9 +3066,16 @@
             <p:ph type="title"/>
           </p:nvPr>
         </p:nvSpPr>
-        <p:spPr/>
-        <p:txBody>
-          <a:bodyPr/>
+        <p:spPr>
+          <a:xfrm>
+            <a:off x="641350" y="195863"/>
+            <a:ext cx="7886700" cy="428624"/>
+          </a:xfrm>
+        </p:spPr>
+        <p:txBody>
+          <a:bodyPr>
+            <a:normAutofit fontScale="90000"/>
+          </a:bodyPr>
           <a:lstStyle/>
           <a:p>
             <a:r>
@@ -3435,7 +3442,7 @@
           <a:p>
             <a:r>
               <a:rPr lang="en-US" dirty="0"/>
-              <a:t>1</a:t>
+              <a:t>2</a:t>
             </a:r>
           </a:p>
         </p:txBody>
@@ -3469,7 +3476,7 @@
           <a:p>
             <a:r>
               <a:rPr lang="en-US" dirty="0"/>
-              <a:t>2</a:t>
+              <a:t>3</a:t>
             </a:r>
           </a:p>
         </p:txBody>
@@ -3503,7 +3510,7 @@
           <a:p>
             <a:r>
               <a:rPr lang="en-US" dirty="0"/>
-              <a:t>3</a:t>
+              <a:t>4</a:t>
             </a:r>
           </a:p>
         </p:txBody>
@@ -3537,7 +3544,7 @@
           <a:p>
             <a:r>
               <a:rPr lang="en-US" dirty="0"/>
-              <a:t>4</a:t>
+              <a:t>5</a:t>
             </a:r>
           </a:p>
         </p:txBody>
@@ -3571,7 +3578,7 @@
           <a:p>
             <a:r>
               <a:rPr lang="en-US" dirty="0"/>
-              <a:t>7</a:t>
+              <a:t>8</a:t>
             </a:r>
           </a:p>
         </p:txBody>
@@ -3605,7 +3612,7 @@
           <a:p>
             <a:r>
               <a:rPr lang="en-US" dirty="0"/>
-              <a:t>8</a:t>
+              <a:t>9</a:t>
             </a:r>
           </a:p>
         </p:txBody>
@@ -3625,7 +3632,7 @@
         <p:spPr>
           <a:xfrm>
             <a:off x="6213790" y="4525879"/>
-            <a:ext cx="301686" cy="369332"/>
+            <a:ext cx="418704" cy="369332"/>
           </a:xfrm>
           <a:prstGeom prst="rect">
             <a:avLst/>
@@ -3639,7 +3646,7 @@
           <a:p>
             <a:r>
               <a:rPr lang="en-US" dirty="0"/>
-              <a:t>9</a:t>
+              <a:t>10</a:t>
             </a:r>
           </a:p>
         </p:txBody>
@@ -3673,7 +3680,7 @@
           <a:p>
             <a:r>
               <a:rPr lang="en-US" dirty="0"/>
-              <a:t>10</a:t>
+              <a:t>11</a:t>
             </a:r>
           </a:p>
         </p:txBody>
@@ -3707,7 +3714,7 @@
           <a:p>
             <a:r>
               <a:rPr lang="en-US" dirty="0"/>
-              <a:t>5</a:t>
+              <a:t>6</a:t>
             </a:r>
           </a:p>
         </p:txBody>
@@ -3741,7 +3748,41 @@
           <a:p>
             <a:r>
               <a:rPr lang="en-US" dirty="0"/>
-              <a:t>6</a:t>
+              <a:t>7</a:t>
+            </a:r>
+          </a:p>
+        </p:txBody>
+      </p:sp>
+      <p:sp>
+        <p:nvSpPr>
+          <p:cNvPr id="23" name="Rectangle 22">
+            <a:extLst>
+              <a:ext uri="{FF2B5EF4-FFF2-40B4-BE49-F238E27FC236}">
+                <a16:creationId xmlns:a16="http://schemas.microsoft.com/office/drawing/2014/main" id="{D445E05E-546E-5D4B-94CC-D41528A16729}"/>
+              </a:ext>
+            </a:extLst>
+          </p:cNvPr>
+          <p:cNvSpPr/>
+          <p:nvPr/>
+        </p:nvSpPr>
+        <p:spPr>
+          <a:xfrm>
+            <a:off x="441264" y="1145184"/>
+            <a:ext cx="2195088" cy="369332"/>
+          </a:xfrm>
+          <a:prstGeom prst="rect">
+            <a:avLst/>
+          </a:prstGeom>
+        </p:spPr>
+        <p:txBody>
+          <a:bodyPr wrap="none">
+            <a:spAutoFit/>
+          </a:bodyPr>
+          <a:lstStyle/>
+          <a:p>
+            <a:r>
+              <a:rPr lang="en-US" dirty="0"/>
+              <a:t>(1 = non-carnivorous)</a:t>
             </a:r>
           </a:p>
         </p:txBody>

</xml_diff>